<commit_message>
Upload 23.05.21(sun) abara seminar
</commit_message>
<xml_diff>
--- a/Season 02/HS980924/20230312_B+Tree.pptx
+++ b/Season 02/HS980924/20230312_B+Tree.pptx
@@ -259,7 +259,7 @@
           <a:p>
             <a:fld id="{BD4B0BDA-64BD-4E38-8882-9CAA52146ACD}" type="datetimeFigureOut">
               <a:rPr lang="ko-KR" altLang="en-US" smtClean="0"/>
-              <a:t>2023-03-12</a:t>
+              <a:t>2023-03-13</a:t>
             </a:fld>
             <a:endParaRPr lang="ko-KR" altLang="en-US"/>
           </a:p>
@@ -429,7 +429,7 @@
           <a:p>
             <a:fld id="{BD4B0BDA-64BD-4E38-8882-9CAA52146ACD}" type="datetimeFigureOut">
               <a:rPr lang="ko-KR" altLang="en-US" smtClean="0"/>
-              <a:t>2023-03-12</a:t>
+              <a:t>2023-03-13</a:t>
             </a:fld>
             <a:endParaRPr lang="ko-KR" altLang="en-US"/>
           </a:p>
@@ -609,7 +609,7 @@
           <a:p>
             <a:fld id="{BD4B0BDA-64BD-4E38-8882-9CAA52146ACD}" type="datetimeFigureOut">
               <a:rPr lang="ko-KR" altLang="en-US" smtClean="0"/>
-              <a:t>2023-03-12</a:t>
+              <a:t>2023-03-13</a:t>
             </a:fld>
             <a:endParaRPr lang="ko-KR" altLang="en-US"/>
           </a:p>
@@ -779,7 +779,7 @@
           <a:p>
             <a:fld id="{BD4B0BDA-64BD-4E38-8882-9CAA52146ACD}" type="datetimeFigureOut">
               <a:rPr lang="ko-KR" altLang="en-US" smtClean="0"/>
-              <a:t>2023-03-12</a:t>
+              <a:t>2023-03-13</a:t>
             </a:fld>
             <a:endParaRPr lang="ko-KR" altLang="en-US"/>
           </a:p>
@@ -1025,7 +1025,7 @@
           <a:p>
             <a:fld id="{BD4B0BDA-64BD-4E38-8882-9CAA52146ACD}" type="datetimeFigureOut">
               <a:rPr lang="ko-KR" altLang="en-US" smtClean="0"/>
-              <a:t>2023-03-12</a:t>
+              <a:t>2023-03-13</a:t>
             </a:fld>
             <a:endParaRPr lang="ko-KR" altLang="en-US"/>
           </a:p>
@@ -1257,7 +1257,7 @@
           <a:p>
             <a:fld id="{BD4B0BDA-64BD-4E38-8882-9CAA52146ACD}" type="datetimeFigureOut">
               <a:rPr lang="ko-KR" altLang="en-US" smtClean="0"/>
-              <a:t>2023-03-12</a:t>
+              <a:t>2023-03-13</a:t>
             </a:fld>
             <a:endParaRPr lang="ko-KR" altLang="en-US"/>
           </a:p>
@@ -1624,7 +1624,7 @@
           <a:p>
             <a:fld id="{BD4B0BDA-64BD-4E38-8882-9CAA52146ACD}" type="datetimeFigureOut">
               <a:rPr lang="ko-KR" altLang="en-US" smtClean="0"/>
-              <a:t>2023-03-12</a:t>
+              <a:t>2023-03-13</a:t>
             </a:fld>
             <a:endParaRPr lang="ko-KR" altLang="en-US"/>
           </a:p>
@@ -1742,7 +1742,7 @@
           <a:p>
             <a:fld id="{BD4B0BDA-64BD-4E38-8882-9CAA52146ACD}" type="datetimeFigureOut">
               <a:rPr lang="ko-KR" altLang="en-US" smtClean="0"/>
-              <a:t>2023-03-12</a:t>
+              <a:t>2023-03-13</a:t>
             </a:fld>
             <a:endParaRPr lang="ko-KR" altLang="en-US"/>
           </a:p>
@@ -1837,7 +1837,7 @@
           <a:p>
             <a:fld id="{BD4B0BDA-64BD-4E38-8882-9CAA52146ACD}" type="datetimeFigureOut">
               <a:rPr lang="ko-KR" altLang="en-US" smtClean="0"/>
-              <a:t>2023-03-12</a:t>
+              <a:t>2023-03-13</a:t>
             </a:fld>
             <a:endParaRPr lang="ko-KR" altLang="en-US"/>
           </a:p>
@@ -2114,7 +2114,7 @@
           <a:p>
             <a:fld id="{BD4B0BDA-64BD-4E38-8882-9CAA52146ACD}" type="datetimeFigureOut">
               <a:rPr lang="ko-KR" altLang="en-US" smtClean="0"/>
-              <a:t>2023-03-12</a:t>
+              <a:t>2023-03-13</a:t>
             </a:fld>
             <a:endParaRPr lang="ko-KR" altLang="en-US"/>
           </a:p>
@@ -2367,7 +2367,7 @@
           <a:p>
             <a:fld id="{BD4B0BDA-64BD-4E38-8882-9CAA52146ACD}" type="datetimeFigureOut">
               <a:rPr lang="ko-KR" altLang="en-US" smtClean="0"/>
-              <a:t>2023-03-12</a:t>
+              <a:t>2023-03-13</a:t>
             </a:fld>
             <a:endParaRPr lang="ko-KR" altLang="en-US"/>
           </a:p>
@@ -2580,7 +2580,7 @@
           <a:p>
             <a:fld id="{BD4B0BDA-64BD-4E38-8882-9CAA52146ACD}" type="datetimeFigureOut">
               <a:rPr lang="ko-KR" altLang="en-US" smtClean="0"/>
-              <a:t>2023-03-12</a:t>
+              <a:t>2023-03-13</a:t>
             </a:fld>
             <a:endParaRPr lang="ko-KR" altLang="en-US"/>
           </a:p>
@@ -3830,16 +3830,7 @@
                 </a:solidFill>
                 <a:latin typeface="+mj-lt"/>
               </a:rPr>
-              <a:t>4-3. </a:t>
-            </a:r>
-            <a:r>
-              <a:rPr lang="en-US" altLang="ko-KR" sz="3600" b="1" dirty="0" smtClean="0">
-                <a:solidFill>
-                  <a:schemeClr val="accent6"/>
-                </a:solidFill>
-                <a:latin typeface="+mj-lt"/>
-              </a:rPr>
-              <a:t>B-Tree</a:t>
+              <a:t>4-3. B-Tree</a:t>
             </a:r>
             <a:r>
               <a:rPr lang="ko-KR" altLang="en-US" sz="3600" b="1" dirty="0">
@@ -4155,16 +4146,7 @@
                 </a:solidFill>
                 <a:latin typeface="+mj-lt"/>
               </a:rPr>
-              <a:t>4-3. </a:t>
-            </a:r>
-            <a:r>
-              <a:rPr lang="en-US" altLang="ko-KR" sz="3600" b="1" dirty="0" smtClean="0">
-                <a:solidFill>
-                  <a:schemeClr val="accent6"/>
-                </a:solidFill>
-                <a:latin typeface="+mj-lt"/>
-              </a:rPr>
-              <a:t>B-Tree</a:t>
+              <a:t>4-3. B-Tree</a:t>
             </a:r>
             <a:r>
               <a:rPr lang="ko-KR" altLang="en-US" sz="3600" b="1" dirty="0">
@@ -4456,16 +4438,7 @@
                 </a:solidFill>
                 <a:latin typeface="+mj-lt"/>
               </a:rPr>
-              <a:t>4-3. </a:t>
-            </a:r>
-            <a:r>
-              <a:rPr lang="en-US" altLang="ko-KR" sz="3600" b="1" dirty="0" smtClean="0">
-                <a:solidFill>
-                  <a:schemeClr val="accent6"/>
-                </a:solidFill>
-                <a:latin typeface="+mj-lt"/>
-              </a:rPr>
-              <a:t>B-Tree</a:t>
+              <a:t>4-3. B-Tree</a:t>
             </a:r>
             <a:r>
               <a:rPr lang="ko-KR" altLang="en-US" sz="3600" b="1" dirty="0">
@@ -6045,7 +6018,6 @@
               <a:rPr lang="en-US" altLang="ko-KR" sz="2000" b="1" dirty="0" smtClean="0"/>
               <a:t>B-Tree</a:t>
             </a:r>
-            <a:endParaRPr lang="en-US" altLang="ko-KR" sz="2000" b="1" dirty="0" smtClean="0"/>
           </a:p>
         </p:txBody>
       </p:sp>
@@ -6530,7 +6502,6 @@
               <a:rPr lang="en-US" altLang="ko-KR" sz="2000" b="1" dirty="0" smtClean="0"/>
               <a:t>.</a:t>
             </a:r>
-            <a:endParaRPr lang="en-US" altLang="ko-KR" sz="2000" b="1" dirty="0" smtClean="0"/>
           </a:p>
           <a:p>
             <a:pPr marL="285750" indent="-285750">
@@ -6793,15 +6764,7 @@
                   <a:srgbClr val="92D050"/>
                 </a:solidFill>
               </a:rPr>
-              <a:t>B+</a:t>
-            </a:r>
-            <a:r>
-              <a:rPr lang="en-US" altLang="ko-KR" sz="4000" b="1" dirty="0" err="1" smtClean="0">
-                <a:solidFill>
-                  <a:srgbClr val="92D050"/>
-                </a:solidFill>
-              </a:rPr>
-              <a:t>Tree</a:t>
+              <a:t>B+Tree</a:t>
             </a:r>
             <a:r>
               <a:rPr lang="en-US" altLang="ko-KR" sz="4000" b="1" dirty="0" smtClean="0">
@@ -7319,16 +7282,7 @@
                 </a:solidFill>
                 <a:latin typeface="+mj-lt"/>
               </a:rPr>
-              <a:t>3. </a:t>
-            </a:r>
-            <a:r>
-              <a:rPr lang="en-US" altLang="ko-KR" sz="3600" b="1" dirty="0" smtClean="0">
-                <a:solidFill>
-                  <a:schemeClr val="accent6"/>
-                </a:solidFill>
-                <a:latin typeface="+mj-lt"/>
-              </a:rPr>
-              <a:t>B-Tree</a:t>
+              <a:t>3. B-Tree</a:t>
             </a:r>
             <a:r>
               <a:rPr lang="ko-KR" altLang="en-US" sz="3600" b="1" dirty="0" smtClean="0">
@@ -7650,16 +7604,7 @@
                 </a:solidFill>
                 <a:latin typeface="+mj-lt"/>
               </a:rPr>
-              <a:t>. </a:t>
-            </a:r>
-            <a:r>
-              <a:rPr lang="en-US" altLang="ko-KR" sz="3600" b="1" smtClean="0">
-                <a:solidFill>
-                  <a:schemeClr val="accent6"/>
-                </a:solidFill>
-                <a:latin typeface="+mj-lt"/>
-              </a:rPr>
-              <a:t>B-Tree</a:t>
+              <a:t>. B-Tree</a:t>
             </a:r>
             <a:r>
               <a:rPr lang="ko-KR" altLang="en-US" sz="3600" b="1" smtClean="0">
@@ -7920,15 +7865,7 @@
                   <a:srgbClr val="92D050"/>
                 </a:solidFill>
               </a:rPr>
-              <a:t>B+</a:t>
-            </a:r>
-            <a:r>
-              <a:rPr lang="en-US" altLang="ko-KR" sz="4000" b="1" dirty="0" err="1" smtClean="0">
-                <a:solidFill>
-                  <a:srgbClr val="92D050"/>
-                </a:solidFill>
-              </a:rPr>
-              <a:t>Tree</a:t>
+              <a:t>B+Tree</a:t>
             </a:r>
             <a:r>
               <a:rPr lang="en-US" altLang="ko-KR" sz="4000" b="1" dirty="0" smtClean="0">
@@ -8262,8 +8199,8 @@
         </p:blipFill>
         <p:spPr>
           <a:xfrm>
-            <a:off x="6099730" y="3791209"/>
-            <a:ext cx="5493533" cy="2010183"/>
+            <a:off x="6099730" y="3696869"/>
+            <a:ext cx="5493533" cy="2104523"/>
           </a:xfrm>
           <a:prstGeom prst="rect">
             <a:avLst/>

</xml_diff>